<commit_message>
split EDA - Model
EDA : encore des aspects à corriger / finaliser   :-/
Model : le scoring n'est pas encore viable (mais le F1-score semble une alternative crédible)  :-(
</commit_message>
<xml_diff>
--- a/P7_Support.pptx
+++ b/P7_Support.pptx
@@ -13,14 +13,11 @@
     <p:sldId id="259" r:id="rId7"/>
     <p:sldId id="258" r:id="rId8"/>
     <p:sldId id="260" r:id="rId9"/>
-    <p:sldId id="262" r:id="rId10"/>
-    <p:sldId id="263" r:id="rId11"/>
+    <p:sldId id="272" r:id="rId10"/>
+    <p:sldId id="262" r:id="rId11"/>
     <p:sldId id="264" r:id="rId12"/>
     <p:sldId id="265" r:id="rId13"/>
-    <p:sldId id="266" r:id="rId14"/>
-    <p:sldId id="267" r:id="rId15"/>
-    <p:sldId id="268" r:id="rId16"/>
-    <p:sldId id="269" r:id="rId17"/>
+    <p:sldId id="268" r:id="rId14"/>
   </p:sldIdLst>
   <p:sldSz cx="12192000" cy="6858000"/>
   <p:notesSz cx="6858000" cy="9144000"/>
@@ -222,7 +219,7 @@
           <a:effectLst/>
           <a:extLst>
             <a:ext uri="{91240B29-F687-4f45-9708-019B960494DF}">
-              <a14:hiddenLine xmlns:a14="http://schemas.microsoft.com/office/drawing/2010/main" xmlns="" w="9525">
+              <a14:hiddenLine xmlns="" xmlns:a14="http://schemas.microsoft.com/office/drawing/2010/main" w="9525">
                 <a:solidFill>
                   <a:srgbClr val="000000"/>
                 </a:solidFill>
@@ -415,7 +412,7 @@
             <a:fld id="{08B9EBBA-996F-894A-B54A-D6246ED52CEA}" type="datetimeFigureOut">
               <a:rPr lang="en-US" dirty="0"/>
               <a:pPr/>
-              <a:t>11/10/2020</a:t>
+              <a:t>11/11/2020</a:t>
             </a:fld>
             <a:endParaRPr lang="en-US" dirty="0"/>
           </a:p>
@@ -730,7 +727,7 @@
             <a:fld id="{18C79C5D-2A6F-F04D-97DA-BEF2467B64E4}" type="datetimeFigureOut">
               <a:rPr lang="en-US" dirty="0"/>
               <a:pPr/>
-              <a:t>11/10/2020</a:t>
+              <a:t>11/11/2020</a:t>
             </a:fld>
             <a:endParaRPr lang="en-US" dirty="0"/>
           </a:p>
@@ -1215,7 +1212,7 @@
             <a:fld id="{8DFA1846-DA80-1C48-A609-854EA85C59AD}" type="datetimeFigureOut">
               <a:rPr lang="en-US" dirty="0"/>
               <a:pPr/>
-              <a:t>11/10/2020</a:t>
+              <a:t>11/11/2020</a:t>
             </a:fld>
             <a:endParaRPr lang="en-US" dirty="0"/>
           </a:p>
@@ -1581,7 +1578,7 @@
             <a:fld id="{FBF54567-0DE4-3F47-BF90-CB84690072F9}" type="datetimeFigureOut">
               <a:rPr lang="en-US" dirty="0"/>
               <a:pPr/>
-              <a:t>11/10/2020</a:t>
+              <a:t>11/11/2020</a:t>
             </a:fld>
             <a:endParaRPr lang="en-US" dirty="0"/>
           </a:p>
@@ -1732,7 +1729,7 @@
           <a:ln/>
           <a:extLst>
             <a:ext uri="{91240B29-F687-4f45-9708-019B960494DF}">
-              <a14:hiddenLine xmlns:a14="http://schemas.microsoft.com/office/drawing/2010/main" xmlns="" w="9525">
+              <a14:hiddenLine xmlns="" xmlns:a14="http://schemas.microsoft.com/office/drawing/2010/main" w="9525">
                 <a:solidFill>
                   <a:srgbClr val="000000"/>
                 </a:solidFill>
@@ -1851,7 +1848,7 @@
             <a:fld id="{C6C52C72-DE31-F449-A4ED-4C594FD91407}" type="datetimeFigureOut">
               <a:rPr lang="en-US" dirty="0"/>
               <a:pPr/>
-              <a:t>11/10/2020</a:t>
+              <a:t>11/11/2020</a:t>
             </a:fld>
             <a:endParaRPr lang="en-US" dirty="0"/>
           </a:p>
@@ -2004,7 +2001,7 @@
           <a:ln/>
           <a:extLst>
             <a:ext uri="{91240B29-F687-4f45-9708-019B960494DF}">
-              <a14:hiddenLine xmlns:a14="http://schemas.microsoft.com/office/drawing/2010/main" xmlns="" w="9525">
+              <a14:hiddenLine xmlns="" xmlns:a14="http://schemas.microsoft.com/office/drawing/2010/main" w="9525">
                 <a:solidFill>
                   <a:srgbClr val="000000"/>
                 </a:solidFill>
@@ -2133,7 +2130,7 @@
             <a:fld id="{ED62726E-379B-B349-9EED-81ED093FA806}" type="datetimeFigureOut">
               <a:rPr lang="en-US" dirty="0"/>
               <a:pPr/>
-              <a:t>11/10/2020</a:t>
+              <a:t>11/11/2020</a:t>
             </a:fld>
             <a:endParaRPr lang="en-US" dirty="0"/>
           </a:p>
@@ -2284,7 +2281,7 @@
           <a:ln/>
           <a:extLst>
             <a:ext uri="{91240B29-F687-4f45-9708-019B960494DF}">
-              <a14:hiddenLine xmlns:a14="http://schemas.microsoft.com/office/drawing/2010/main" xmlns="" w="9525">
+              <a14:hiddenLine xmlns="" xmlns:a14="http://schemas.microsoft.com/office/drawing/2010/main" w="9525">
                 <a:solidFill>
                   <a:srgbClr val="000000"/>
                 </a:solidFill>
@@ -2413,7 +2410,7 @@
             <a:fld id="{9B3A1323-8D79-1946-B0D7-40001CF92E9D}" type="datetimeFigureOut">
               <a:rPr lang="en-US" dirty="0"/>
               <a:pPr/>
-              <a:t>11/10/2020</a:t>
+              <a:t>11/11/2020</a:t>
             </a:fld>
             <a:endParaRPr lang="en-US" dirty="0"/>
           </a:p>
@@ -2753,7 +2750,7 @@
             <a:fld id="{8DFA1846-DA80-1C48-A609-854EA85C59AD}" type="datetimeFigureOut">
               <a:rPr lang="en-US" dirty="0"/>
               <a:pPr/>
-              <a:t>11/10/2020</a:t>
+              <a:t>11/11/2020</a:t>
             </a:fld>
             <a:endParaRPr lang="en-US" dirty="0"/>
           </a:p>
@@ -2904,7 +2901,7 @@
           <a:ln/>
           <a:extLst>
             <a:ext uri="{91240B29-F687-4f45-9708-019B960494DF}">
-              <a14:hiddenLine xmlns:a14="http://schemas.microsoft.com/office/drawing/2010/main" xmlns="" w="9525">
+              <a14:hiddenLine xmlns="" xmlns:a14="http://schemas.microsoft.com/office/drawing/2010/main" w="9525">
                 <a:solidFill>
                   <a:srgbClr val="000000"/>
                 </a:solidFill>
@@ -3089,7 +3086,7 @@
             <a:fld id="{57302355-E14B-8545-A8F8-0FE83CC9D524}" type="datetimeFigureOut">
               <a:rPr lang="en-US" dirty="0"/>
               <a:pPr/>
-              <a:t>11/10/2020</a:t>
+              <a:t>11/11/2020</a:t>
             </a:fld>
             <a:endParaRPr lang="en-US" dirty="0"/>
           </a:p>
@@ -3240,7 +3237,7 @@
           <a:ln/>
           <a:extLst>
             <a:ext uri="{91240B29-F687-4f45-9708-019B960494DF}">
-              <a14:hiddenLine xmlns:a14="http://schemas.microsoft.com/office/drawing/2010/main" xmlns="" w="9525">
+              <a14:hiddenLine xmlns="" xmlns:a14="http://schemas.microsoft.com/office/drawing/2010/main" w="9525">
                 <a:solidFill>
                   <a:srgbClr val="000000"/>
                 </a:solidFill>
@@ -3563,7 +3560,7 @@
             <a:fld id="{02640F58-564D-2B4F-AE67-E407BA4FCF45}" type="datetimeFigureOut">
               <a:rPr lang="en-US" dirty="0"/>
               <a:pPr/>
-              <a:t>11/10/2020</a:t>
+              <a:t>11/11/2020</a:t>
             </a:fld>
             <a:endParaRPr lang="en-US" dirty="0"/>
           </a:p>
@@ -3714,7 +3711,7 @@
           <a:ln/>
           <a:extLst>
             <a:ext uri="{91240B29-F687-4f45-9708-019B960494DF}">
-              <a14:hiddenLine xmlns:a14="http://schemas.microsoft.com/office/drawing/2010/main" xmlns="" w="9525">
+              <a14:hiddenLine xmlns="" xmlns:a14="http://schemas.microsoft.com/office/drawing/2010/main" w="9525">
                 <a:solidFill>
                   <a:srgbClr val="000000"/>
                 </a:solidFill>
@@ -3781,7 +3778,7 @@
             <a:fld id="{F13A34C8-038E-2045-AF43-DF7DBB8E0E9E}" type="datetimeFigureOut">
               <a:rPr lang="en-US" dirty="0"/>
               <a:pPr/>
-              <a:t>11/10/2020</a:t>
+              <a:t>11/11/2020</a:t>
             </a:fld>
             <a:endParaRPr lang="en-US" dirty="0"/>
           </a:p>
@@ -3873,7 +3870,7 @@
             <a:fld id="{8818C68F-D26B-8F47-958C-23B49CF8A634}" type="datetimeFigureOut">
               <a:rPr lang="en-US" dirty="0"/>
               <a:pPr/>
-              <a:t>11/10/2020</a:t>
+              <a:t>11/11/2020</a:t>
             </a:fld>
             <a:endParaRPr lang="en-US" dirty="0"/>
           </a:p>
@@ -4137,7 +4134,7 @@
           <a:ln/>
           <a:extLst>
             <a:ext uri="{91240B29-F687-4f45-9708-019B960494DF}">
-              <a14:hiddenLine xmlns:a14="http://schemas.microsoft.com/office/drawing/2010/main" xmlns="" w="9525">
+              <a14:hiddenLine xmlns="" xmlns:a14="http://schemas.microsoft.com/office/drawing/2010/main" w="9525">
                 <a:solidFill>
                   <a:srgbClr val="000000"/>
                 </a:solidFill>
@@ -4337,7 +4334,7 @@
             <a:fld id="{D0DF5E60-9974-AC48-9591-99C2BB44B7CF}" type="datetimeFigureOut">
               <a:rPr lang="en-US" dirty="0"/>
               <a:pPr/>
-              <a:t>11/10/2020</a:t>
+              <a:t>11/11/2020</a:t>
             </a:fld>
             <a:endParaRPr lang="en-US" dirty="0"/>
           </a:p>
@@ -4647,7 +4644,7 @@
             <a:fld id="{18C79C5D-2A6F-F04D-97DA-BEF2467B64E4}" type="datetimeFigureOut">
               <a:rPr lang="en-US" dirty="0"/>
               <a:pPr/>
-              <a:t>11/10/2020</a:t>
+              <a:t>11/11/2020</a:t>
             </a:fld>
             <a:endParaRPr lang="en-US" dirty="0"/>
           </a:p>
@@ -4914,7 +4911,7 @@
             <a:fld id="{09B482E8-6E0E-1B4F-B1FD-C69DB9E858D9}" type="datetimeFigureOut">
               <a:rPr lang="en-US" dirty="0"/>
               <a:pPr/>
-              <a:t>11/10/2020</a:t>
+              <a:t>11/11/2020</a:t>
             </a:fld>
             <a:endParaRPr lang="en-US" dirty="0"/>
           </a:p>
@@ -5609,7 +5606,7 @@
           <p:cNvPr id="2" name="Titre 1">
             <a:extLst>
               <a:ext uri="{FF2B5EF4-FFF2-40B4-BE49-F238E27FC236}">
-                <a16:creationId xmlns:a16="http://schemas.microsoft.com/office/drawing/2014/main" id="{CCFC69F8-4278-4495-ABC7-72C3EE961DB3}"/>
+                <a16:creationId xmlns:a16="http://schemas.microsoft.com/office/drawing/2014/main" id="{2C265249-C86C-4EAD-85EA-A41377319A7B}"/>
               </a:ext>
             </a:extLst>
           </p:cNvPr>
@@ -5627,7 +5624,7 @@
           <a:p>
             <a:r>
               <a:rPr lang="en-US" dirty="0"/>
-              <a:t>CREDIT_UTILIZATION </a:t>
+              <a:t>LATE_PAYMENT</a:t>
             </a:r>
           </a:p>
         </p:txBody>
@@ -5637,7 +5634,7 @@
           <p:cNvPr id="3" name="Espace réservé du contenu 2">
             <a:extLst>
               <a:ext uri="{FF2B5EF4-FFF2-40B4-BE49-F238E27FC236}">
-                <a16:creationId xmlns:a16="http://schemas.microsoft.com/office/drawing/2014/main" id="{C8B308CF-455B-4948-8572-A4AA26958922}"/>
+                <a16:creationId xmlns:a16="http://schemas.microsoft.com/office/drawing/2014/main" id="{C1A7C45D-8544-4EA6-A3C1-1DD622D2D3F4}"/>
               </a:ext>
             </a:extLst>
           </p:cNvPr>
@@ -5650,37 +5647,65 @@
         </p:nvSpPr>
         <p:spPr/>
         <p:txBody>
-          <a:bodyPr>
-            <a:normAutofit fontScale="92500" lnSpcReduction="20000"/>
-          </a:bodyPr>
+          <a:bodyPr/>
           <a:lstStyle/>
           <a:p>
             <a:r>
               <a:rPr lang="en-US" dirty="0"/>
-              <a:t>CREDIT_UTILIZATION feature: In blogs and papers I've read, most of them was saying credit utilization is a strong indicator for a risky customer and you can calculate it simply by dividing Credit card balance by credit card limit. It was making sense but </a:t>
-            </a:r>
+              <a:t>LATE_PAYMENT feature: I think most of you used installment['DAYS_INSTALMENT']-installment['DAYS_ENTRY_PAYMENT'] as a new feature since it shows number of delays. It was a already good feature but I realized that, when you take last 365 days of installment data and aggregate this delay as a new feature, it added much more value to model. Here is a simple code:</a:t>
+            </a:r>
+          </a:p>
+          <a:p>
+            <a:endParaRPr lang="en-US" dirty="0"/>
+          </a:p>
+          <a:p>
             <a:r>
               <a:rPr lang="en-US" dirty="0" err="1"/>
-              <a:t>didnt</a:t>
-            </a:r>
-            <a:r>
-              <a:rPr lang="en-US" dirty="0"/>
-              <a:t> work when I calculated on full credit card dataset. Again I tried checking results on more recent credit card data. Finally I've found that last 2 months' data was more valuable for my model. You can see the simple code and check yourself with different months:</a:t>
-            </a:r>
-          </a:p>
-          <a:p>
-            <a:endParaRPr lang="en-US" dirty="0"/>
-          </a:p>
-          <a:p>
-            <a:r>
-              <a:rPr lang="en-US" dirty="0"/>
-              <a:t>month = -2 </a:t>
-            </a:r>
-          </a:p>
-          <a:p>
+              <a:t>installment_temp</a:t>
+            </a:r>
+            <a:r>
+              <a:rPr lang="en-US" dirty="0"/>
+              <a:t> = installment[</a:t>
+            </a:r>
             <a:r>
               <a:rPr lang="en-US" dirty="0" err="1"/>
-              <a:t>cred_temp</a:t>
+              <a:t>installment.DAYS_ENTRY_PAYMENT</a:t>
+            </a:r>
+            <a:r>
+              <a:rPr lang="en-US" dirty="0"/>
+              <a:t> &gt;= -365]</a:t>
+            </a:r>
+          </a:p>
+          <a:p>
+            <a:r>
+              <a:rPr lang="en-US" dirty="0" err="1"/>
+              <a:t>installment_temp</a:t>
+            </a:r>
+            <a:r>
+              <a:rPr lang="en-US" dirty="0"/>
+              <a:t>['LATE_PAYMENT'] = </a:t>
+            </a:r>
+            <a:r>
+              <a:rPr lang="en-US" dirty="0" err="1"/>
+              <a:t>installment_temp</a:t>
+            </a:r>
+            <a:r>
+              <a:rPr lang="en-US" dirty="0"/>
+              <a:t>['DAYS_INSTALMENT']-</a:t>
+            </a:r>
+            <a:r>
+              <a:rPr lang="en-US" dirty="0" err="1"/>
+              <a:t>installment_temp</a:t>
+            </a:r>
+            <a:r>
+              <a:rPr lang="en-US" dirty="0"/>
+              <a:t>['DAYS_ENTRY_PAYMENT']</a:t>
+            </a:r>
+          </a:p>
+          <a:p>
+            <a:r>
+              <a:rPr lang="en-US" dirty="0" err="1"/>
+              <a:t>late_payment_feature</a:t>
             </a:r>
             <a:r>
               <a:rPr lang="en-US" dirty="0"/>
@@ -5688,63 +5713,11 @@
             </a:r>
             <a:r>
               <a:rPr lang="en-US" dirty="0" err="1"/>
-              <a:t>cred_card_bal</a:t>
-            </a:r>
-            <a:r>
-              <a:rPr lang="en-US" dirty="0"/>
-              <a:t>[</a:t>
-            </a:r>
-            <a:r>
-              <a:rPr lang="en-US" dirty="0" err="1"/>
-              <a:t>cred_card_bal.MONTHS_BALANCE</a:t>
-            </a:r>
-            <a:r>
-              <a:rPr lang="en-US" dirty="0"/>
-              <a:t> &gt;= month]</a:t>
-            </a:r>
-          </a:p>
-          <a:p>
-            <a:r>
-              <a:rPr lang="en-US" dirty="0" err="1"/>
-              <a:t>cred_temp</a:t>
-            </a:r>
-            <a:r>
-              <a:rPr lang="en-US" dirty="0"/>
-              <a:t>['CRED_UTIL'] = </a:t>
-            </a:r>
-            <a:r>
-              <a:rPr lang="en-US" dirty="0" err="1"/>
-              <a:t>cred_temp</a:t>
-            </a:r>
-            <a:r>
-              <a:rPr lang="en-US" dirty="0"/>
-              <a:t>['AMT_BALANCE'] / </a:t>
-            </a:r>
-            <a:r>
-              <a:rPr lang="en-US" dirty="0" err="1"/>
-              <a:t>cred_temp</a:t>
-            </a:r>
-            <a:r>
-              <a:rPr lang="en-US" dirty="0"/>
-              <a:t>['AMT_CREDIT_LIMIT_ACTUAL']</a:t>
-            </a:r>
-          </a:p>
-          <a:p>
-            <a:r>
-              <a:rPr lang="en-US" dirty="0" err="1"/>
-              <a:t>cred_util_feature</a:t>
-            </a:r>
-            <a:r>
-              <a:rPr lang="en-US" dirty="0"/>
-              <a:t> = </a:t>
-            </a:r>
-            <a:r>
-              <a:rPr lang="en-US" dirty="0" err="1"/>
-              <a:t>cred_temp.groupby</a:t>
-            </a:r>
-            <a:r>
-              <a:rPr lang="en-US" dirty="0"/>
-              <a:t>('SK_ID_CURR')['CRED_UTIL'].max().</a:t>
+              <a:t>installment_temp.groupby</a:t>
+            </a:r>
+            <a:r>
+              <a:rPr lang="en-US" dirty="0"/>
+              <a:t>('SK_ID_CURR')[['LATE_PAYMENT']].min().</a:t>
             </a:r>
             <a:r>
               <a:rPr lang="en-US" dirty="0" err="1"/>
@@ -5752,15 +5725,7 @@
             </a:r>
             <a:r>
               <a:rPr lang="en-US" dirty="0"/>
-              <a:t>().rename(columns={'</a:t>
-            </a:r>
-            <a:r>
-              <a:rPr lang="en-US" dirty="0" err="1"/>
-              <a:t>CRED_UTIL':'CRED_UTIL_'+str</a:t>
-            </a:r>
-            <a:r>
-              <a:rPr lang="en-US" dirty="0"/>
-              <a:t>(month*-1)})</a:t>
+              <a:t>()</a:t>
             </a:r>
           </a:p>
         </p:txBody>
@@ -5768,7 +5733,7 @@
     </p:spTree>
     <p:extLst>
       <p:ext uri="{BB962C8B-B14F-4D97-AF65-F5344CB8AC3E}">
-        <p14:creationId xmlns:p14="http://schemas.microsoft.com/office/powerpoint/2010/main" val="2813253690"/>
+        <p14:creationId xmlns:p14="http://schemas.microsoft.com/office/powerpoint/2010/main" val="3694431998"/>
       </p:ext>
     </p:extLst>
   </p:cSld>
@@ -6141,516 +6106,6 @@
           <p:cNvPr id="2" name="Titre 1">
             <a:extLst>
               <a:ext uri="{FF2B5EF4-FFF2-40B4-BE49-F238E27FC236}">
-                <a16:creationId xmlns:a16="http://schemas.microsoft.com/office/drawing/2014/main" id="{89E3F334-3E8C-45FA-85D5-B05F4AF2FED7}"/>
-              </a:ext>
-            </a:extLst>
-          </p:cNvPr>
-          <p:cNvSpPr>
-            <a:spLocks noGrp="1"/>
-          </p:cNvSpPr>
-          <p:nvPr>
-            <p:ph type="title"/>
-          </p:nvPr>
-        </p:nvSpPr>
-        <p:spPr/>
-        <p:txBody>
-          <a:bodyPr/>
-          <a:lstStyle/>
-          <a:p>
-            <a:r>
-              <a:rPr lang="en-US" dirty="0"/>
-              <a:t>Interest Rate Features / application</a:t>
-            </a:r>
-          </a:p>
-        </p:txBody>
-      </p:sp>
-      <p:sp>
-        <p:nvSpPr>
-          <p:cNvPr id="3" name="Espace réservé du contenu 2">
-            <a:extLst>
-              <a:ext uri="{FF2B5EF4-FFF2-40B4-BE49-F238E27FC236}">
-                <a16:creationId xmlns:a16="http://schemas.microsoft.com/office/drawing/2014/main" id="{A9A06234-8285-4FA7-86D9-57F91633B493}"/>
-              </a:ext>
-            </a:extLst>
-          </p:cNvPr>
-          <p:cNvSpPr>
-            <a:spLocks noGrp="1"/>
-          </p:cNvSpPr>
-          <p:nvPr>
-            <p:ph idx="1"/>
-          </p:nvPr>
-        </p:nvSpPr>
-        <p:spPr/>
-        <p:txBody>
-          <a:bodyPr>
-            <a:normAutofit fontScale="85000" lnSpcReduction="10000"/>
-          </a:bodyPr>
-          <a:lstStyle/>
-          <a:p>
-            <a:r>
-              <a:rPr lang="en-US" dirty="0"/>
-              <a:t>We were not given CNT_PAYMENT in Main Application data and but we could predict it from Previous Application table. I built a </a:t>
-            </a:r>
-            <a:r>
-              <a:rPr lang="en-US" dirty="0" err="1"/>
-              <a:t>lightgbm</a:t>
-            </a:r>
-            <a:r>
-              <a:rPr lang="en-US" dirty="0"/>
-              <a:t> from Previous Application table by using AMT_CREDIT, AMT_ANNUITY, AMT_CREDIT/AMT_ANNUITY to predict CNT_PAYMENT. The model got a RMSE ~2.78. After applying the model on Main Application table, I got predicted CNT_PAYMENT(EXP_TERM) for each record and then I created exact same features as I did for previous app table. After applying the model on Main Application table, I got predicted CNT_PAYMENT(EXP_TERM) for each record and then I created exact same features as I did for previous app table.</a:t>
-            </a:r>
-          </a:p>
-          <a:p>
-            <a:endParaRPr lang="en-US" dirty="0"/>
-          </a:p>
-          <a:p>
-            <a:r>
-              <a:rPr lang="en-US" dirty="0" err="1"/>
-              <a:t>main_app</a:t>
-            </a:r>
-            <a:r>
-              <a:rPr lang="en-US" dirty="0"/>
-              <a:t>['INTEREST'] = </a:t>
-            </a:r>
-            <a:r>
-              <a:rPr lang="en-US" dirty="0" err="1"/>
-              <a:t>main_app</a:t>
-            </a:r>
-            <a:r>
-              <a:rPr lang="en-US" dirty="0"/>
-              <a:t>['EXP_TERM']*</a:t>
-            </a:r>
-            <a:r>
-              <a:rPr lang="en-US" dirty="0" err="1"/>
-              <a:t>main_app</a:t>
-            </a:r>
-            <a:r>
-              <a:rPr lang="en-US" dirty="0"/>
-              <a:t>['AMT_ANNUITY'] - </a:t>
-            </a:r>
-            <a:r>
-              <a:rPr lang="en-US" dirty="0" err="1"/>
-              <a:t>main_app</a:t>
-            </a:r>
-            <a:r>
-              <a:rPr lang="en-US" dirty="0"/>
-              <a:t>['AMT_CREDIT']</a:t>
-            </a:r>
-          </a:p>
-          <a:p>
-            <a:r>
-              <a:rPr lang="en-US" dirty="0" err="1"/>
-              <a:t>main_app</a:t>
-            </a:r>
-            <a:r>
-              <a:rPr lang="en-US" dirty="0"/>
-              <a:t>['INTEREST_RATE'] = 24*</a:t>
-            </a:r>
-            <a:r>
-              <a:rPr lang="en-US" dirty="0" err="1"/>
-              <a:t>main_app</a:t>
-            </a:r>
-            <a:r>
-              <a:rPr lang="en-US" dirty="0"/>
-              <a:t>['INTEREST']/(</a:t>
-            </a:r>
-            <a:r>
-              <a:rPr lang="en-US" dirty="0" err="1"/>
-              <a:t>main_app</a:t>
-            </a:r>
-            <a:r>
-              <a:rPr lang="en-US" dirty="0"/>
-              <a:t>['AMT_CREDIT']*(</a:t>
-            </a:r>
-            <a:r>
-              <a:rPr lang="en-US" dirty="0" err="1"/>
-              <a:t>main_app</a:t>
-            </a:r>
-            <a:r>
-              <a:rPr lang="en-US" dirty="0"/>
-              <a:t>['EXP_TERM']+1))</a:t>
-            </a:r>
-          </a:p>
-          <a:p>
-            <a:r>
-              <a:rPr lang="en-US" dirty="0" err="1"/>
-              <a:t>main_app</a:t>
-            </a:r>
-            <a:r>
-              <a:rPr lang="en-US" dirty="0"/>
-              <a:t>['INTEREST_SHARE'] = </a:t>
-            </a:r>
-            <a:r>
-              <a:rPr lang="en-US" dirty="0" err="1"/>
-              <a:t>main_app</a:t>
-            </a:r>
-            <a:r>
-              <a:rPr lang="en-US" dirty="0"/>
-              <a:t>['INTEREST']/</a:t>
-            </a:r>
-            <a:r>
-              <a:rPr lang="en-US" dirty="0" err="1"/>
-              <a:t>main_app</a:t>
-            </a:r>
-            <a:r>
-              <a:rPr lang="en-US" dirty="0"/>
-              <a:t>['AMT_CREDIT']</a:t>
-            </a:r>
-          </a:p>
-          <a:p>
-            <a:r>
-              <a:rPr lang="en-US" dirty="0"/>
-              <a:t>Overall, several of these interest rate related features joined my top 10 </a:t>
-            </a:r>
-            <a:r>
-              <a:rPr lang="en-US" dirty="0" err="1"/>
-              <a:t>lgb</a:t>
-            </a:r>
-            <a:r>
-              <a:rPr lang="en-US" dirty="0"/>
-              <a:t> features and gave ~0.0006 boost in CV.</a:t>
-            </a:r>
-          </a:p>
-        </p:txBody>
-      </p:sp>
-    </p:spTree>
-    <p:extLst>
-      <p:ext uri="{BB962C8B-B14F-4D97-AF65-F5344CB8AC3E}">
-        <p14:creationId xmlns:p14="http://schemas.microsoft.com/office/powerpoint/2010/main" val="2120134826"/>
-      </p:ext>
-    </p:extLst>
-  </p:cSld>
-  <p:clrMapOvr>
-    <a:masterClrMapping/>
-  </p:clrMapOvr>
-</p:sld>
-</file>
-
-<file path=ppt/slides/slide14.xml><?xml version="1.0" encoding="utf-8"?>
-<p:sld xmlns:a="http://schemas.openxmlformats.org/drawingml/2006/main" xmlns:r="http://schemas.openxmlformats.org/officeDocument/2006/relationships" xmlns:p="http://schemas.openxmlformats.org/presentationml/2006/main">
-  <p:cSld>
-    <p:spTree>
-      <p:nvGrpSpPr>
-        <p:cNvPr id="1" name=""/>
-        <p:cNvGrpSpPr/>
-        <p:nvPr/>
-      </p:nvGrpSpPr>
-      <p:grpSpPr>
-        <a:xfrm>
-          <a:off x="0" y="0"/>
-          <a:ext cx="0" cy="0"/>
-          <a:chOff x="0" y="0"/>
-          <a:chExt cx="0" cy="0"/>
-        </a:xfrm>
-      </p:grpSpPr>
-      <p:sp>
-        <p:nvSpPr>
-          <p:cNvPr id="2" name="Titre 1">
-            <a:extLst>
-              <a:ext uri="{FF2B5EF4-FFF2-40B4-BE49-F238E27FC236}">
-                <a16:creationId xmlns:a16="http://schemas.microsoft.com/office/drawing/2014/main" id="{7B922E7B-0EB1-4ED1-96B2-DFC42B11C5B7}"/>
-              </a:ext>
-            </a:extLst>
-          </p:cNvPr>
-          <p:cNvSpPr>
-            <a:spLocks noGrp="1"/>
-          </p:cNvSpPr>
-          <p:nvPr>
-            <p:ph type="title"/>
-          </p:nvPr>
-        </p:nvSpPr>
-        <p:spPr/>
-        <p:txBody>
-          <a:bodyPr/>
-          <a:lstStyle/>
-          <a:p>
-            <a:r>
-              <a:rPr lang="en-US" dirty="0"/>
-              <a:t>Filtering Previous application data by NAME_CONTRACT_STATUS column </a:t>
-            </a:r>
-          </a:p>
-        </p:txBody>
-      </p:sp>
-      <p:sp>
-        <p:nvSpPr>
-          <p:cNvPr id="3" name="Espace réservé du contenu 2">
-            <a:extLst>
-              <a:ext uri="{FF2B5EF4-FFF2-40B4-BE49-F238E27FC236}">
-                <a16:creationId xmlns:a16="http://schemas.microsoft.com/office/drawing/2014/main" id="{54F49E57-6048-485B-ACAB-BF60C4DA4EB4}"/>
-              </a:ext>
-            </a:extLst>
-          </p:cNvPr>
-          <p:cNvSpPr>
-            <a:spLocks noGrp="1"/>
-          </p:cNvSpPr>
-          <p:nvPr>
-            <p:ph idx="1"/>
-          </p:nvPr>
-        </p:nvSpPr>
-        <p:spPr/>
-        <p:txBody>
-          <a:bodyPr>
-            <a:normAutofit fontScale="92500" lnSpcReduction="20000"/>
-          </a:bodyPr>
-          <a:lstStyle/>
-          <a:p>
-            <a:r>
-              <a:rPr lang="en-US" dirty="0"/>
-              <a:t>for value in </a:t>
-            </a:r>
-            <a:r>
-              <a:rPr lang="en-US" dirty="0" err="1"/>
-              <a:t>prev.NAME_PRODUCT_TYPE.unique</a:t>
-            </a:r>
-            <a:r>
-              <a:rPr lang="en-US" dirty="0"/>
-              <a:t>(): #prev is the previous application data</a:t>
-            </a:r>
-          </a:p>
-          <a:p>
-            <a:r>
-              <a:rPr lang="en-US" dirty="0"/>
-              <a:t>    </a:t>
-            </a:r>
-            <a:r>
-              <a:rPr lang="en-US" dirty="0" err="1"/>
-              <a:t>prev_approved</a:t>
-            </a:r>
-            <a:r>
-              <a:rPr lang="en-US" dirty="0"/>
-              <a:t> = </a:t>
-            </a:r>
-            <a:r>
-              <a:rPr lang="en-US" dirty="0" err="1"/>
-              <a:t>prev</a:t>
-            </a:r>
-            <a:r>
-              <a:rPr lang="en-US" dirty="0"/>
-              <a:t>[</a:t>
-            </a:r>
-            <a:r>
-              <a:rPr lang="en-US" dirty="0" err="1"/>
-              <a:t>prev.NAME_CONTRACT_STATUS</a:t>
-            </a:r>
-            <a:r>
-              <a:rPr lang="en-US" dirty="0"/>
-              <a:t> == value]</a:t>
-            </a:r>
-          </a:p>
-          <a:p>
-            <a:r>
-              <a:rPr lang="en-US" dirty="0"/>
-              <a:t>    print(value)</a:t>
-            </a:r>
-          </a:p>
-          <a:p>
-            <a:r>
-              <a:rPr lang="en-US" dirty="0"/>
-              <a:t>    </a:t>
-            </a:r>
-            <a:r>
-              <a:rPr lang="en-US" dirty="0" err="1"/>
-              <a:t>num_cols</a:t>
-            </a:r>
-            <a:r>
-              <a:rPr lang="en-US" dirty="0"/>
-              <a:t> = </a:t>
-            </a:r>
-            <a:r>
-              <a:rPr lang="en-US" dirty="0" err="1"/>
-              <a:t>prev_approved.columns</a:t>
-            </a:r>
-            <a:r>
-              <a:rPr lang="en-US" dirty="0"/>
-              <a:t>[</a:t>
-            </a:r>
-            <a:r>
-              <a:rPr lang="en-US" dirty="0" err="1"/>
-              <a:t>prev_approved.dtypes</a:t>
-            </a:r>
-            <a:r>
-              <a:rPr lang="en-US" dirty="0"/>
-              <a:t>!= object]</a:t>
-            </a:r>
-          </a:p>
-          <a:p>
-            <a:r>
-              <a:rPr lang="en-US" dirty="0"/>
-              <a:t>    </a:t>
-            </a:r>
-            <a:r>
-              <a:rPr lang="en-US" dirty="0" err="1"/>
-              <a:t>num_cols</a:t>
-            </a:r>
-            <a:r>
-              <a:rPr lang="en-US" dirty="0"/>
-              <a:t> = [col for col in </a:t>
-            </a:r>
-            <a:r>
-              <a:rPr lang="en-US" dirty="0" err="1"/>
-              <a:t>num_cols</a:t>
-            </a:r>
-            <a:r>
-              <a:rPr lang="en-US" dirty="0"/>
-              <a:t> if col not in ['SK_ID_CURR','SK_ID_PREV']]</a:t>
-            </a:r>
-          </a:p>
-          <a:p>
-            <a:r>
-              <a:rPr lang="en-US" dirty="0"/>
-              <a:t>    features = </a:t>
-            </a:r>
-            <a:r>
-              <a:rPr lang="en-US" dirty="0" err="1"/>
-              <a:t>prev_approved.groupby</a:t>
-            </a:r>
-            <a:r>
-              <a:rPr lang="en-US" dirty="0"/>
-              <a:t>('SK_ID_CURR')[</a:t>
-            </a:r>
-            <a:r>
-              <a:rPr lang="en-US" dirty="0" err="1"/>
-              <a:t>num_cols</a:t>
-            </a:r>
-            <a:r>
-              <a:rPr lang="en-US" dirty="0"/>
-              <a:t>].max().</a:t>
-            </a:r>
-            <a:r>
-              <a:rPr lang="en-US" dirty="0" err="1"/>
-              <a:t>reset_index</a:t>
-            </a:r>
-            <a:r>
-              <a:rPr lang="en-US" dirty="0"/>
-              <a:t>()</a:t>
-            </a:r>
-          </a:p>
-          <a:p>
-            <a:r>
-              <a:rPr lang="en-US" dirty="0"/>
-              <a:t>    </a:t>
-            </a:r>
-            <a:r>
-              <a:rPr lang="en-US" dirty="0" err="1"/>
-              <a:t>newcols</a:t>
-            </a:r>
-            <a:r>
-              <a:rPr lang="en-US" dirty="0"/>
-              <a:t> = ['_'+value+'_max'+'_</a:t>
-            </a:r>
-            <a:r>
-              <a:rPr lang="en-US" dirty="0" err="1"/>
-              <a:t>prev</a:t>
-            </a:r>
-            <a:r>
-              <a:rPr lang="en-US" dirty="0"/>
-              <a:t>_'+col for col in </a:t>
-            </a:r>
-            <a:r>
-              <a:rPr lang="en-US" dirty="0" err="1"/>
-              <a:t>features.columns</a:t>
-            </a:r>
-            <a:r>
-              <a:rPr lang="en-US" dirty="0"/>
-              <a:t> if col not in ['SK_ID_CURR']]</a:t>
-            </a:r>
-          </a:p>
-          <a:p>
-            <a:r>
-              <a:rPr lang="en-US" dirty="0" err="1"/>
-              <a:t>features.columns</a:t>
-            </a:r>
-            <a:r>
-              <a:rPr lang="en-US" dirty="0"/>
-              <a:t> = ['SK_ID_CURR']+</a:t>
-            </a:r>
-            <a:r>
-              <a:rPr lang="en-US" dirty="0" err="1"/>
-              <a:t>newcols</a:t>
-            </a:r>
-            <a:endParaRPr lang="en-US" dirty="0"/>
-          </a:p>
-          <a:p>
-            <a:r>
-              <a:rPr lang="en-US" dirty="0"/>
-              <a:t>    data = </a:t>
-            </a:r>
-            <a:r>
-              <a:rPr lang="en-US" dirty="0" err="1"/>
-              <a:t>data.merge</a:t>
-            </a:r>
-            <a:r>
-              <a:rPr lang="en-US" dirty="0"/>
-              <a:t>(</a:t>
-            </a:r>
-            <a:r>
-              <a:rPr lang="en-US" dirty="0" err="1"/>
-              <a:t>features,'left','SK_ID_CURR</a:t>
-            </a:r>
-            <a:r>
-              <a:rPr lang="en-US" dirty="0"/>
-              <a:t>')</a:t>
-            </a:r>
-          </a:p>
-          <a:p>
-            <a:r>
-              <a:rPr lang="en-US" dirty="0"/>
-              <a:t>    test = </a:t>
-            </a:r>
-            <a:r>
-              <a:rPr lang="en-US" dirty="0" err="1"/>
-              <a:t>test.merge</a:t>
-            </a:r>
-            <a:r>
-              <a:rPr lang="en-US" dirty="0"/>
-              <a:t>(</a:t>
-            </a:r>
-            <a:r>
-              <a:rPr lang="en-US" dirty="0" err="1"/>
-              <a:t>features,'left','SK_ID_CURR</a:t>
-            </a:r>
-            <a:r>
-              <a:rPr lang="en-US" dirty="0"/>
-              <a:t>')</a:t>
-            </a:r>
-          </a:p>
-        </p:txBody>
-      </p:sp>
-    </p:spTree>
-    <p:extLst>
-      <p:ext uri="{BB962C8B-B14F-4D97-AF65-F5344CB8AC3E}">
-        <p14:creationId xmlns:p14="http://schemas.microsoft.com/office/powerpoint/2010/main" val="15089491"/>
-      </p:ext>
-    </p:extLst>
-  </p:cSld>
-  <p:clrMapOvr>
-    <a:masterClrMapping/>
-  </p:clrMapOvr>
-</p:sld>
-</file>
-
-<file path=ppt/slides/slide15.xml><?xml version="1.0" encoding="utf-8"?>
-<p:sld xmlns:a="http://schemas.openxmlformats.org/drawingml/2006/main" xmlns:r="http://schemas.openxmlformats.org/officeDocument/2006/relationships" xmlns:p="http://schemas.openxmlformats.org/presentationml/2006/main">
-  <p:cSld>
-    <p:spTree>
-      <p:nvGrpSpPr>
-        <p:cNvPr id="1" name=""/>
-        <p:cNvGrpSpPr/>
-        <p:nvPr/>
-      </p:nvGrpSpPr>
-      <p:grpSpPr>
-        <a:xfrm>
-          <a:off x="0" y="0"/>
-          <a:ext cx="0" cy="0"/>
-          <a:chOff x="0" y="0"/>
-          <a:chExt cx="0" cy="0"/>
-        </a:xfrm>
-      </p:grpSpPr>
-      <p:sp>
-        <p:nvSpPr>
-          <p:cNvPr id="2" name="Titre 1">
-            <a:extLst>
-              <a:ext uri="{FF2B5EF4-FFF2-40B4-BE49-F238E27FC236}">
                 <a16:creationId xmlns:a16="http://schemas.microsoft.com/office/drawing/2014/main" id="{055047BF-746B-444D-8BB4-CC17E7758635}"/>
               </a:ext>
             </a:extLst>
@@ -6846,100 +6301,6 @@
     <p:extLst>
       <p:ext uri="{BB962C8B-B14F-4D97-AF65-F5344CB8AC3E}">
         <p14:creationId xmlns:p14="http://schemas.microsoft.com/office/powerpoint/2010/main" val="1436579337"/>
-      </p:ext>
-    </p:extLst>
-  </p:cSld>
-  <p:clrMapOvr>
-    <a:masterClrMapping/>
-  </p:clrMapOvr>
-</p:sld>
-</file>
-
-<file path=ppt/slides/slide16.xml><?xml version="1.0" encoding="utf-8"?>
-<p:sld xmlns:a="http://schemas.openxmlformats.org/drawingml/2006/main" xmlns:r="http://schemas.openxmlformats.org/officeDocument/2006/relationships" xmlns:p="http://schemas.openxmlformats.org/presentationml/2006/main">
-  <p:cSld>
-    <p:spTree>
-      <p:nvGrpSpPr>
-        <p:cNvPr id="1" name=""/>
-        <p:cNvGrpSpPr/>
-        <p:nvPr/>
-      </p:nvGrpSpPr>
-      <p:grpSpPr>
-        <a:xfrm>
-          <a:off x="0" y="0"/>
-          <a:ext cx="0" cy="0"/>
-          <a:chOff x="0" y="0"/>
-          <a:chExt cx="0" cy="0"/>
-        </a:xfrm>
-      </p:grpSpPr>
-      <p:sp>
-        <p:nvSpPr>
-          <p:cNvPr id="2" name="Titre 1">
-            <a:extLst>
-              <a:ext uri="{FF2B5EF4-FFF2-40B4-BE49-F238E27FC236}">
-                <a16:creationId xmlns:a16="http://schemas.microsoft.com/office/drawing/2014/main" id="{B5ADC8C3-4B57-4F3C-858B-0704F35B37E5}"/>
-              </a:ext>
-            </a:extLst>
-          </p:cNvPr>
-          <p:cNvSpPr>
-            <a:spLocks noGrp="1"/>
-          </p:cNvSpPr>
-          <p:nvPr>
-            <p:ph type="title"/>
-          </p:nvPr>
-        </p:nvSpPr>
-        <p:spPr/>
-        <p:txBody>
-          <a:bodyPr/>
-          <a:lstStyle/>
-          <a:p>
-            <a:endParaRPr lang="en-US"/>
-          </a:p>
-        </p:txBody>
-      </p:sp>
-      <p:cxnSp>
-        <p:nvCxnSpPr>
-          <p:cNvPr id="5" name="Connecteur droit avec flèche 4">
-            <a:extLst>
-              <a:ext uri="{FF2B5EF4-FFF2-40B4-BE49-F238E27FC236}">
-                <a16:creationId xmlns:a16="http://schemas.microsoft.com/office/drawing/2014/main" id="{159291BD-8C7E-4C6C-864E-18C0477D5E44}"/>
-              </a:ext>
-            </a:extLst>
-          </p:cNvPr>
-          <p:cNvCxnSpPr/>
-          <p:nvPr/>
-        </p:nvCxnSpPr>
-        <p:spPr>
-          <a:xfrm>
-            <a:off x="1988820" y="2613660"/>
-            <a:ext cx="6743700" cy="0"/>
-          </a:xfrm>
-          <a:prstGeom prst="straightConnector1">
-            <a:avLst/>
-          </a:prstGeom>
-          <a:ln>
-            <a:tailEnd type="triangle"/>
-          </a:ln>
-        </p:spPr>
-        <p:style>
-          <a:lnRef idx="1">
-            <a:schemeClr val="accent1"/>
-          </a:lnRef>
-          <a:fillRef idx="0">
-            <a:schemeClr val="accent1"/>
-          </a:fillRef>
-          <a:effectRef idx="0">
-            <a:schemeClr val="accent1"/>
-          </a:effectRef>
-          <a:fontRef idx="minor">
-            <a:schemeClr val="tx1"/>
-          </a:fontRef>
-        </p:style>
-      </p:cxnSp>
-    </p:spTree>
-    <p:extLst>
-      <p:ext uri="{BB962C8B-B14F-4D97-AF65-F5344CB8AC3E}">
-        <p14:creationId xmlns:p14="http://schemas.microsoft.com/office/powerpoint/2010/main" val="73836535"/>
       </p:ext>
     </p:extLst>
   </p:cSld>
@@ -10382,7 +9743,7 @@
           <p:cNvPr id="2" name="Titre 1">
             <a:extLst>
               <a:ext uri="{FF2B5EF4-FFF2-40B4-BE49-F238E27FC236}">
-                <a16:creationId xmlns:a16="http://schemas.microsoft.com/office/drawing/2014/main" id="{2C265249-C86C-4EAD-85EA-A41377319A7B}"/>
+                <a16:creationId xmlns:a16="http://schemas.microsoft.com/office/drawing/2014/main" id="{FD05C0B8-5F2B-4BA9-B98E-2ABE90BAC6CB}"/>
               </a:ext>
             </a:extLst>
           </p:cNvPr>
@@ -10400,116 +9761,254 @@
           <a:p>
             <a:r>
               <a:rPr lang="en-US" dirty="0"/>
-              <a:t>LATE_PAYMENT</a:t>
-            </a:r>
-          </a:p>
-        </p:txBody>
-      </p:sp>
-      <p:sp>
-        <p:nvSpPr>
-          <p:cNvPr id="3" name="Espace réservé du contenu 2">
+              <a:t>Model scoring</a:t>
+            </a:r>
+          </a:p>
+        </p:txBody>
+      </p:sp>
+      <p:pic>
+        <p:nvPicPr>
+          <p:cNvPr id="4" name="Image 3">
             <a:extLst>
               <a:ext uri="{FF2B5EF4-FFF2-40B4-BE49-F238E27FC236}">
-                <a16:creationId xmlns:a16="http://schemas.microsoft.com/office/drawing/2014/main" id="{C1A7C45D-8544-4EA6-A3C1-1DD622D2D3F4}"/>
+                <a16:creationId xmlns:a16="http://schemas.microsoft.com/office/drawing/2014/main" id="{D45CC487-9227-4B6E-AE9F-A03618C61CB0}"/>
               </a:ext>
             </a:extLst>
           </p:cNvPr>
-          <p:cNvSpPr>
-            <a:spLocks noGrp="1"/>
-          </p:cNvSpPr>
+          <p:cNvPicPr>
+            <a:picLocks noChangeAspect="1"/>
+          </p:cNvPicPr>
+          <p:nvPr/>
+        </p:nvPicPr>
+        <p:blipFill>
+          <a:blip r:embed="rId2"/>
+          <a:stretch>
+            <a:fillRect/>
+          </a:stretch>
+        </p:blipFill>
+        <p:spPr>
+          <a:xfrm>
+            <a:off x="394060" y="1536487"/>
+            <a:ext cx="2697010" cy="5051124"/>
+          </a:xfrm>
+          <a:prstGeom prst="rect">
+            <a:avLst/>
+          </a:prstGeom>
+        </p:spPr>
+      </p:pic>
+      <p:graphicFrame>
+        <p:nvGraphicFramePr>
+          <p:cNvPr id="12" name="Tableau 12">
+            <a:extLst>
+              <a:ext uri="{FF2B5EF4-FFF2-40B4-BE49-F238E27FC236}">
+                <a16:creationId xmlns:a16="http://schemas.microsoft.com/office/drawing/2014/main" id="{FEE4A446-F479-463B-8353-270981C7B5D6}"/>
+              </a:ext>
+            </a:extLst>
+          </p:cNvPr>
+          <p:cNvGraphicFramePr>
+            <a:graphicFrameLocks noGrp="1"/>
+          </p:cNvGraphicFramePr>
           <p:nvPr>
             <p:ph idx="1"/>
-          </p:nvPr>
-        </p:nvSpPr>
-        <p:spPr/>
-        <p:txBody>
-          <a:bodyPr/>
-          <a:lstStyle/>
-          <a:p>
-            <a:r>
-              <a:rPr lang="en-US" dirty="0"/>
-              <a:t>LATE_PAYMENT feature: I think most of you used installment['DAYS_INSTALMENT']-installment['DAYS_ENTRY_PAYMENT'] as a new feature since it shows number of delays. It was a already good feature but I realized that, when you take last 365 days of installment data and aggregate this delay as a new feature, it added much more value to model. Here is a simple code:</a:t>
-            </a:r>
-          </a:p>
-          <a:p>
-            <a:endParaRPr lang="en-US" dirty="0"/>
-          </a:p>
-          <a:p>
-            <a:r>
-              <a:rPr lang="en-US" dirty="0" err="1"/>
-              <a:t>installment_temp</a:t>
-            </a:r>
-            <a:r>
-              <a:rPr lang="en-US" dirty="0"/>
-              <a:t> = installment[</a:t>
-            </a:r>
-            <a:r>
-              <a:rPr lang="en-US" dirty="0" err="1"/>
-              <a:t>installment.DAYS_ENTRY_PAYMENT</a:t>
-            </a:r>
-            <a:r>
-              <a:rPr lang="en-US" dirty="0"/>
-              <a:t> &gt;= -365]</a:t>
-            </a:r>
-          </a:p>
-          <a:p>
-            <a:r>
-              <a:rPr lang="en-US" dirty="0" err="1"/>
-              <a:t>installment_temp</a:t>
-            </a:r>
-            <a:r>
-              <a:rPr lang="en-US" dirty="0"/>
-              <a:t>['LATE_PAYMENT'] = </a:t>
-            </a:r>
-            <a:r>
-              <a:rPr lang="en-US" dirty="0" err="1"/>
-              <a:t>installment_temp</a:t>
-            </a:r>
-            <a:r>
-              <a:rPr lang="en-US" dirty="0"/>
-              <a:t>['DAYS_INSTALMENT']-</a:t>
-            </a:r>
-            <a:r>
-              <a:rPr lang="en-US" dirty="0" err="1"/>
-              <a:t>installment_temp</a:t>
-            </a:r>
-            <a:r>
-              <a:rPr lang="en-US" dirty="0"/>
-              <a:t>['DAYS_ENTRY_PAYMENT']</a:t>
-            </a:r>
-          </a:p>
-          <a:p>
-            <a:r>
-              <a:rPr lang="en-US" dirty="0" err="1"/>
-              <a:t>late_payment_feature</a:t>
-            </a:r>
-            <a:r>
-              <a:rPr lang="en-US" dirty="0"/>
-              <a:t> = </a:t>
-            </a:r>
-            <a:r>
-              <a:rPr lang="en-US" dirty="0" err="1"/>
-              <a:t>installment_temp.groupby</a:t>
-            </a:r>
-            <a:r>
-              <a:rPr lang="en-US" dirty="0"/>
-              <a:t>('SK_ID_CURR')[['LATE_PAYMENT']].min().</a:t>
-            </a:r>
-            <a:r>
-              <a:rPr lang="en-US" dirty="0" err="1"/>
-              <a:t>reset_index</a:t>
-            </a:r>
-            <a:r>
-              <a:rPr lang="en-US" dirty="0"/>
-              <a:t>()</a:t>
-            </a:r>
-          </a:p>
-        </p:txBody>
-      </p:sp>
+            <p:extLst>
+              <p:ext uri="{D42A27DB-BD31-4B8C-83A1-F6EECF244321}">
+                <p14:modId xmlns:p14="http://schemas.microsoft.com/office/powerpoint/2010/main" val="326718712"/>
+              </p:ext>
+            </p:extLst>
+          </p:nvPr>
+        </p:nvGraphicFramePr>
+        <p:xfrm>
+          <a:off x="5317724" y="1609941"/>
+          <a:ext cx="4794492" cy="1920240"/>
+        </p:xfrm>
+        <a:graphic>
+          <a:graphicData uri="http://schemas.openxmlformats.org/drawingml/2006/table">
+            <a:tbl>
+              <a:tblPr firstRow="1" bandRow="1">
+                <a:tableStyleId>{5C22544A-7EE6-4342-B048-85BDC9FD1C3A}</a:tableStyleId>
+              </a:tblPr>
+              <a:tblGrid>
+                <a:gridCol w="1598164">
+                  <a:extLst>
+                    <a:ext uri="{9D8B030D-6E8A-4147-A177-3AD203B41FA5}">
+                      <a16:colId xmlns:a16="http://schemas.microsoft.com/office/drawing/2014/main" val="2173841301"/>
+                    </a:ext>
+                  </a:extLst>
+                </a:gridCol>
+                <a:gridCol w="1598164">
+                  <a:extLst>
+                    <a:ext uri="{9D8B030D-6E8A-4147-A177-3AD203B41FA5}">
+                      <a16:colId xmlns:a16="http://schemas.microsoft.com/office/drawing/2014/main" val="767980492"/>
+                    </a:ext>
+                  </a:extLst>
+                </a:gridCol>
+                <a:gridCol w="1598164">
+                  <a:extLst>
+                    <a:ext uri="{9D8B030D-6E8A-4147-A177-3AD203B41FA5}">
+                      <a16:colId xmlns:a16="http://schemas.microsoft.com/office/drawing/2014/main" val="2567302872"/>
+                    </a:ext>
+                  </a:extLst>
+                </a:gridCol>
+              </a:tblGrid>
+              <a:tr h="370840">
+                <a:tc>
+                  <a:txBody>
+                    <a:bodyPr/>
+                    <a:lstStyle/>
+                    <a:p>
+                      <a:endParaRPr lang="en-US"/>
+                    </a:p>
+                  </a:txBody>
+                  <a:tcPr/>
+                </a:tc>
+                <a:tc>
+                  <a:txBody>
+                    <a:bodyPr/>
+                    <a:lstStyle/>
+                    <a:p>
+                      <a:r>
+                        <a:rPr lang="en-US" dirty="0"/>
+                        <a:t>Actual Good</a:t>
+                      </a:r>
+                    </a:p>
+                  </a:txBody>
+                  <a:tcPr/>
+                </a:tc>
+                <a:tc>
+                  <a:txBody>
+                    <a:bodyPr/>
+                    <a:lstStyle/>
+                    <a:p>
+                      <a:r>
+                        <a:rPr lang="en-US" dirty="0"/>
+                        <a:t>Actual </a:t>
+                      </a:r>
+                    </a:p>
+                    <a:p>
+                      <a:r>
+                        <a:rPr lang="en-US" dirty="0"/>
+                        <a:t>Bad</a:t>
+                      </a:r>
+                    </a:p>
+                  </a:txBody>
+                  <a:tcPr/>
+                </a:tc>
+                <a:extLst>
+                  <a:ext uri="{0D108BD9-81ED-4DB2-BD59-A6C34878D82A}">
+                    <a16:rowId xmlns:a16="http://schemas.microsoft.com/office/drawing/2014/main" val="542198579"/>
+                  </a:ext>
+                </a:extLst>
+              </a:tr>
+              <a:tr h="370840">
+                <a:tc>
+                  <a:txBody>
+                    <a:bodyPr/>
+                    <a:lstStyle/>
+                    <a:p>
+                      <a:r>
+                        <a:rPr lang="en-US" dirty="0"/>
+                        <a:t>Predicted Good</a:t>
+                      </a:r>
+                    </a:p>
+                  </a:txBody>
+                  <a:tcPr/>
+                </a:tc>
+                <a:tc>
+                  <a:txBody>
+                    <a:bodyPr/>
+                    <a:lstStyle/>
+                    <a:p>
+                      <a:r>
+                        <a:rPr lang="en-US" dirty="0" err="1"/>
+                        <a:t>tn</a:t>
+                      </a:r>
+                      <a:endParaRPr lang="en-US" dirty="0"/>
+                    </a:p>
+                  </a:txBody>
+                  <a:tcPr/>
+                </a:tc>
+                <a:tc>
+                  <a:txBody>
+                    <a:bodyPr/>
+                    <a:lstStyle/>
+                    <a:p>
+                      <a:r>
+                        <a:rPr lang="en-US" dirty="0" err="1"/>
+                        <a:t>fn</a:t>
+                      </a:r>
+                      <a:endParaRPr lang="en-US" dirty="0"/>
+                    </a:p>
+                  </a:txBody>
+                  <a:tcPr/>
+                </a:tc>
+                <a:extLst>
+                  <a:ext uri="{0D108BD9-81ED-4DB2-BD59-A6C34878D82A}">
+                    <a16:rowId xmlns:a16="http://schemas.microsoft.com/office/drawing/2014/main" val="1738922171"/>
+                  </a:ext>
+                </a:extLst>
+              </a:tr>
+              <a:tr h="370840">
+                <a:tc>
+                  <a:txBody>
+                    <a:bodyPr/>
+                    <a:lstStyle/>
+                    <a:p>
+                      <a:r>
+                        <a:rPr lang="en-US" dirty="0"/>
+                        <a:t>Predicted</a:t>
+                      </a:r>
+                    </a:p>
+                    <a:p>
+                      <a:r>
+                        <a:rPr lang="en-US" dirty="0"/>
+                        <a:t>Bad</a:t>
+                      </a:r>
+                    </a:p>
+                  </a:txBody>
+                  <a:tcPr/>
+                </a:tc>
+                <a:tc>
+                  <a:txBody>
+                    <a:bodyPr/>
+                    <a:lstStyle/>
+                    <a:p>
+                      <a:r>
+                        <a:rPr lang="en-US" dirty="0" err="1"/>
+                        <a:t>fp</a:t>
+                      </a:r>
+                      <a:endParaRPr lang="en-US" dirty="0"/>
+                    </a:p>
+                  </a:txBody>
+                  <a:tcPr/>
+                </a:tc>
+                <a:tc>
+                  <a:txBody>
+                    <a:bodyPr/>
+                    <a:lstStyle/>
+                    <a:p>
+                      <a:r>
+                        <a:rPr lang="en-US" dirty="0" err="1"/>
+                        <a:t>tp</a:t>
+                      </a:r>
+                      <a:endParaRPr lang="en-US" dirty="0"/>
+                    </a:p>
+                  </a:txBody>
+                  <a:tcPr/>
+                </a:tc>
+                <a:extLst>
+                  <a:ext uri="{0D108BD9-81ED-4DB2-BD59-A6C34878D82A}">
+                    <a16:rowId xmlns:a16="http://schemas.microsoft.com/office/drawing/2014/main" val="2155475029"/>
+                  </a:ext>
+                </a:extLst>
+              </a:tr>
+            </a:tbl>
+          </a:graphicData>
+        </a:graphic>
+      </p:graphicFrame>
     </p:spTree>
     <p:extLst>
       <p:ext uri="{BB962C8B-B14F-4D97-AF65-F5344CB8AC3E}">
-        <p14:creationId xmlns:p14="http://schemas.microsoft.com/office/powerpoint/2010/main" val="3694431998"/>
+        <p14:creationId xmlns:p14="http://schemas.microsoft.com/office/powerpoint/2010/main" val="2836849427"/>
       </p:ext>
     </p:extLst>
   </p:cSld>

</xml_diff>